<commit_message>
Updating presentasion 01 and 02
</commit_message>
<xml_diff>
--- a/161702/presentation/02 - Review Divide and Conquer/02. Review Divide and Conquer.pptx
+++ b/161702/presentation/02 - Review Divide and Conquer/02. Review Divide and Conquer.pptx
@@ -22,7 +22,7 @@
       <p:boldItalic r:id="rId8"/>
     </p:embeddedFont>
     <p:embeddedFont>
-      <p:font typeface="Source Sans Pro" panose="020B0503030403020204" pitchFamily="34" charset="0"/>
+      <p:font typeface="Source Sans Pro" panose="020B0503030403020204" charset="0"/>
       <p:regular r:id="rId9"/>
       <p:bold r:id="rId10"/>
       <p:italic r:id="rId11"/>
@@ -3544,10 +3544,29 @@
           <a:p>
             <a:r>
               <a:rPr lang="en-US" dirty="0" smtClean="0"/>
-              <a:t>Example Case: Cut Rod/Rod Cutting</a:t>
-            </a:r>
-          </a:p>
-          <a:p>
+              <a:t>Example Case: Cut Rod/Rod </a:t>
+            </a:r>
+            <a:r>
+              <a:rPr lang="en-US" dirty="0" smtClean="0"/>
+              <a:t>Cutting</a:t>
+            </a:r>
+          </a:p>
+          <a:p>
+            <a:pPr lvl="1"/>
+            <a:r>
+              <a:rPr lang="en-US" dirty="0" smtClean="0"/>
+              <a:t>Problem Observation</a:t>
+            </a:r>
+          </a:p>
+          <a:p>
+            <a:pPr lvl="1"/>
+            <a:r>
+              <a:rPr lang="en-US" dirty="0" smtClean="0"/>
+              <a:t>Problem Simplification</a:t>
+            </a:r>
+          </a:p>
+          <a:p>
+            <a:pPr lvl="1"/>
             <a:endParaRPr lang="en-US" dirty="0" smtClean="0"/>
           </a:p>
         </p:txBody>
@@ -3562,6 +3581,13 @@
   <p:clrMapOvr>
     <a:masterClrMapping/>
   </p:clrMapOvr>
+  <p:timing>
+    <p:tnLst>
+      <p:par>
+        <p:cTn id="1" dur="indefinite" restart="never" nodeType="tmRoot"/>
+      </p:par>
+    </p:tnLst>
+  </p:timing>
 </p:sld>
 </file>
 

</xml_diff>

<commit_message>
Updating presentation for Week 03
</commit_message>
<xml_diff>
--- a/161702/presentation/02 - Review Divide and Conquer/02. Review Divide and Conquer.pptx
+++ b/161702/presentation/02 - Review Divide and Conquer/02. Review Divide and Conquer.pptx
@@ -32,14 +32,14 @@
       <p:boldItalic r:id="rId18"/>
     </p:embeddedFont>
     <p:embeddedFont>
-      <p:font typeface="PT Serif" panose="020A0603040505020204" pitchFamily="18" charset="0"/>
+      <p:font typeface="PT Sans" panose="020B0503020203020204" pitchFamily="34" charset="0"/>
       <p:regular r:id="rId19"/>
       <p:bold r:id="rId20"/>
       <p:italic r:id="rId21"/>
       <p:boldItalic r:id="rId22"/>
     </p:embeddedFont>
     <p:embeddedFont>
-      <p:font typeface="PT Sans" panose="020B0503020203020204" pitchFamily="34" charset="0"/>
+      <p:font typeface="PT Serif" panose="020A0603040505020204" pitchFamily="18" charset="0"/>
       <p:regular r:id="rId23"/>
       <p:bold r:id="rId24"/>
       <p:italic r:id="rId25"/>
@@ -231,7 +231,7 @@
           <a:p>
             <a:fld id="{54A0D01E-5226-49DB-B876-7FE474C4AC43}" type="datetimeFigureOut">
               <a:rPr lang="en-US" smtClean="0"/>
-              <a:t>2/13/2017</a:t>
+              <a:t>2/20/2017</a:t>
             </a:fld>
             <a:endParaRPr lang="en-US"/>
           </a:p>
@@ -714,7 +714,7 @@
           <a:p>
             <a:fld id="{98558AF6-4215-4AC6-9EE0-A56FB7B1541C}" type="datetimeFigureOut">
               <a:rPr lang="en-US" smtClean="0"/>
-              <a:t>2/13/2017</a:t>
+              <a:t>2/20/2017</a:t>
             </a:fld>
             <a:endParaRPr lang="en-US"/>
           </a:p>
@@ -884,7 +884,7 @@
           <a:p>
             <a:fld id="{98558AF6-4215-4AC6-9EE0-A56FB7B1541C}" type="datetimeFigureOut">
               <a:rPr lang="en-US" smtClean="0"/>
-              <a:t>2/13/2017</a:t>
+              <a:t>2/20/2017</a:t>
             </a:fld>
             <a:endParaRPr lang="en-US"/>
           </a:p>
@@ -1064,7 +1064,7 @@
           <a:p>
             <a:fld id="{98558AF6-4215-4AC6-9EE0-A56FB7B1541C}" type="datetimeFigureOut">
               <a:rPr lang="en-US" smtClean="0"/>
-              <a:t>2/13/2017</a:t>
+              <a:t>2/20/2017</a:t>
             </a:fld>
             <a:endParaRPr lang="en-US"/>
           </a:p>
@@ -1234,7 +1234,7 @@
           <a:p>
             <a:fld id="{98558AF6-4215-4AC6-9EE0-A56FB7B1541C}" type="datetimeFigureOut">
               <a:rPr lang="en-US" smtClean="0"/>
-              <a:t>2/13/2017</a:t>
+              <a:t>2/20/2017</a:t>
             </a:fld>
             <a:endParaRPr lang="en-US"/>
           </a:p>
@@ -1478,7 +1478,7 @@
           <a:p>
             <a:fld id="{98558AF6-4215-4AC6-9EE0-A56FB7B1541C}" type="datetimeFigureOut">
               <a:rPr lang="en-US" smtClean="0"/>
-              <a:t>2/13/2017</a:t>
+              <a:t>2/20/2017</a:t>
             </a:fld>
             <a:endParaRPr lang="en-US"/>
           </a:p>
@@ -1710,7 +1710,7 @@
           <a:p>
             <a:fld id="{98558AF6-4215-4AC6-9EE0-A56FB7B1541C}" type="datetimeFigureOut">
               <a:rPr lang="en-US" smtClean="0"/>
-              <a:t>2/13/2017</a:t>
+              <a:t>2/20/2017</a:t>
             </a:fld>
             <a:endParaRPr lang="en-US"/>
           </a:p>
@@ -2077,7 +2077,7 @@
           <a:p>
             <a:fld id="{98558AF6-4215-4AC6-9EE0-A56FB7B1541C}" type="datetimeFigureOut">
               <a:rPr lang="en-US" smtClean="0"/>
-              <a:t>2/13/2017</a:t>
+              <a:t>2/20/2017</a:t>
             </a:fld>
             <a:endParaRPr lang="en-US"/>
           </a:p>
@@ -2195,7 +2195,7 @@
           <a:p>
             <a:fld id="{98558AF6-4215-4AC6-9EE0-A56FB7B1541C}" type="datetimeFigureOut">
               <a:rPr lang="en-US" smtClean="0"/>
-              <a:t>2/13/2017</a:t>
+              <a:t>2/20/2017</a:t>
             </a:fld>
             <a:endParaRPr lang="en-US"/>
           </a:p>
@@ -2290,7 +2290,7 @@
           <a:p>
             <a:fld id="{98558AF6-4215-4AC6-9EE0-A56FB7B1541C}" type="datetimeFigureOut">
               <a:rPr lang="en-US" smtClean="0"/>
-              <a:t>2/13/2017</a:t>
+              <a:t>2/20/2017</a:t>
             </a:fld>
             <a:endParaRPr lang="en-US"/>
           </a:p>
@@ -2567,7 +2567,7 @@
           <a:p>
             <a:fld id="{98558AF6-4215-4AC6-9EE0-A56FB7B1541C}" type="datetimeFigureOut">
               <a:rPr lang="en-US" smtClean="0"/>
-              <a:t>2/13/2017</a:t>
+              <a:t>2/20/2017</a:t>
             </a:fld>
             <a:endParaRPr lang="en-US"/>
           </a:p>
@@ -2824,7 +2824,7 @@
           <a:p>
             <a:fld id="{98558AF6-4215-4AC6-9EE0-A56FB7B1541C}" type="datetimeFigureOut">
               <a:rPr lang="en-US" smtClean="0"/>
-              <a:t>2/13/2017</a:t>
+              <a:t>2/20/2017</a:t>
             </a:fld>
             <a:endParaRPr lang="en-US"/>
           </a:p>
@@ -3037,7 +3037,7 @@
           <a:p>
             <a:fld id="{98558AF6-4215-4AC6-9EE0-A56FB7B1541C}" type="datetimeFigureOut">
               <a:rPr lang="en-US" smtClean="0"/>
-              <a:t>2/13/2017</a:t>
+              <a:t>2/20/2017</a:t>
             </a:fld>
             <a:endParaRPr lang="en-US"/>
           </a:p>
@@ -3865,11 +3865,7 @@
           <a:p>
             <a:r>
               <a:rPr lang="en-US" dirty="0" smtClean="0"/>
-              <a:t>Example Case: Cut Rod/Rod </a:t>
-            </a:r>
-            <a:r>
-              <a:rPr lang="en-US" dirty="0" smtClean="0"/>
-              <a:t>Cutting</a:t>
+              <a:t>Example Case: Cut Rod/Rod Cutting</a:t>
             </a:r>
           </a:p>
           <a:p>
@@ -3885,7 +3881,6 @@
               <a:rPr lang="en-US" dirty="0" smtClean="0"/>
               <a:t>Recurrence</a:t>
             </a:r>
-            <a:endParaRPr lang="en-US" dirty="0" smtClean="0"/>
           </a:p>
           <a:p>
             <a:pPr lvl="1"/>

</xml_diff>